<commit_message>
updated in3 and in4 slides
</commit_message>
<xml_diff>
--- a/assets/ppt/intro/in4-stages-of-a-compiler.pptx
+++ b/assets/ppt/intro/in4-stages-of-a-compiler.pptx
@@ -7090,219 +7090,6 @@
       </p:sp>
       <p:sp>
         <p:nvSpPr>
-          <p:cNvPr id="5" name="Shape 252">
-            <a:extLst>
-              <a:ext uri="{FF2B5EF4-FFF2-40B4-BE49-F238E27FC236}">
-                <a16:creationId xmlns:a16="http://schemas.microsoft.com/office/drawing/2014/main" id="{0B7F23E7-60E3-CF4B-B859-75F7B890EECF}"/>
-              </a:ext>
-            </a:extLst>
-          </p:cNvPr>
-          <p:cNvSpPr txBox="1"/>
-          <p:nvPr/>
-        </p:nvSpPr>
-        <p:spPr>
-          <a:xfrm>
-            <a:off x="4860236" y="2371475"/>
-            <a:ext cx="3086100" cy="2442045"/>
-          </a:xfrm>
-          <a:prstGeom prst="rect">
-            <a:avLst/>
-          </a:prstGeom>
-          <a:noFill/>
-          <a:ln w="15875" cap="flat" cmpd="sng">
-            <a:solidFill>
-              <a:schemeClr val="dk1"/>
-            </a:solidFill>
-            <a:prstDash val="solid"/>
-            <a:miter/>
-            <a:headEnd type="none" w="med" len="med"/>
-            <a:tailEnd type="none" w="med" len="med"/>
-          </a:ln>
-        </p:spPr>
-        <p:txBody>
-          <a:bodyPr lIns="68569" tIns="34275" rIns="68569" bIns="34275" anchor="t" anchorCtr="0">
-            <a:noAutofit/>
-          </a:bodyPr>
-          <a:lstStyle/>
-          <a:p>
-            <a:pPr>
-              <a:buSzPct val="25000"/>
-            </a:pPr>
-            <a:r>
-              <a:rPr lang="en-US" sz="1500" b="1">
-                <a:solidFill>
-                  <a:srgbClr val="CC00CC"/>
-                </a:solidFill>
-                <a:latin typeface="Courier New"/>
-                <a:ea typeface="Courier New"/>
-                <a:cs typeface="Courier New"/>
-                <a:sym typeface="Courier New"/>
-              </a:rPr>
-              <a:t>T_DOUBLE  	  (“double”)</a:t>
-            </a:r>
-            <a:br>
-              <a:rPr lang="en-US" sz="1500" b="1">
-                <a:solidFill>
-                  <a:srgbClr val="CC00CC"/>
-                </a:solidFill>
-                <a:latin typeface="Courier New"/>
-                <a:ea typeface="Courier New"/>
-                <a:cs typeface="Courier New"/>
-                <a:sym typeface="Courier New"/>
-              </a:rPr>
-            </a:br>
-            <a:r>
-              <a:rPr lang="en-US" sz="1500" b="1">
-                <a:solidFill>
-                  <a:srgbClr val="CC00CC"/>
-                </a:solidFill>
-                <a:latin typeface="Courier New"/>
-                <a:ea typeface="Courier New"/>
-                <a:cs typeface="Courier New"/>
-                <a:sym typeface="Courier New"/>
-              </a:rPr>
-              <a:t>T_IDENT 	  (“f”)</a:t>
-            </a:r>
-            <a:br>
-              <a:rPr lang="en-US" sz="1500" b="1">
-                <a:solidFill>
-                  <a:srgbClr val="CC00CC"/>
-                </a:solidFill>
-                <a:latin typeface="Courier New"/>
-                <a:ea typeface="Courier New"/>
-                <a:cs typeface="Courier New"/>
-                <a:sym typeface="Courier New"/>
-              </a:rPr>
-            </a:br>
-            <a:r>
-              <a:rPr lang="en-US" sz="1500" b="1">
-                <a:solidFill>
-                  <a:srgbClr val="CC00CC"/>
-                </a:solidFill>
-                <a:latin typeface="Courier New"/>
-                <a:ea typeface="Courier New"/>
-                <a:cs typeface="Courier New"/>
-                <a:sym typeface="Courier New"/>
-              </a:rPr>
-              <a:t>T_OP 		  (“=“)</a:t>
-            </a:r>
-            <a:br>
-              <a:rPr lang="en-US" sz="1500" b="1">
-                <a:solidFill>
-                  <a:srgbClr val="CC00CC"/>
-                </a:solidFill>
-                <a:latin typeface="Courier New"/>
-                <a:ea typeface="Courier New"/>
-                <a:cs typeface="Courier New"/>
-                <a:sym typeface="Courier New"/>
-              </a:rPr>
-            </a:br>
-            <a:r>
-              <a:rPr lang="en-US" sz="1500" b="1">
-                <a:solidFill>
-                  <a:srgbClr val="CC00CC"/>
-                </a:solidFill>
-                <a:latin typeface="Courier New"/>
-                <a:ea typeface="Courier New"/>
-                <a:cs typeface="Courier New"/>
-                <a:sym typeface="Courier New"/>
-              </a:rPr>
-              <a:t>T_IDENT	  (“sqrt”) T_LPAREN 	  (“(“)</a:t>
-            </a:r>
-          </a:p>
-          <a:p>
-            <a:pPr>
-              <a:spcBef>
-                <a:spcPts val="300"/>
-              </a:spcBef>
-              <a:buSzPct val="25000"/>
-            </a:pPr>
-            <a:r>
-              <a:rPr lang="en-US" sz="1500" b="1">
-                <a:solidFill>
-                  <a:srgbClr val="CC00CC"/>
-                </a:solidFill>
-                <a:latin typeface="Courier New"/>
-                <a:ea typeface="Courier New"/>
-                <a:cs typeface="Courier New"/>
-                <a:sym typeface="Courier New"/>
-              </a:rPr>
-              <a:t>T_OP 		  (“-”)</a:t>
-            </a:r>
-            <a:br>
-              <a:rPr lang="en-US" sz="1500" b="1">
-                <a:solidFill>
-                  <a:srgbClr val="CC00CC"/>
-                </a:solidFill>
-                <a:latin typeface="Courier New"/>
-                <a:ea typeface="Courier New"/>
-                <a:cs typeface="Courier New"/>
-                <a:sym typeface="Courier New"/>
-              </a:rPr>
-            </a:br>
-            <a:r>
-              <a:rPr lang="en-US" sz="1500" b="1">
-                <a:solidFill>
-                  <a:srgbClr val="CC00CC"/>
-                </a:solidFill>
-                <a:latin typeface="Courier New"/>
-                <a:ea typeface="Courier New"/>
-                <a:cs typeface="Courier New"/>
-                <a:sym typeface="Courier New"/>
-              </a:rPr>
-              <a:t>T_INTCONSTANT (“1”)</a:t>
-            </a:r>
-            <a:br>
-              <a:rPr lang="en-US" sz="1500" b="1">
-                <a:solidFill>
-                  <a:srgbClr val="CC00CC"/>
-                </a:solidFill>
-                <a:latin typeface="Courier New"/>
-                <a:ea typeface="Courier New"/>
-                <a:cs typeface="Courier New"/>
-                <a:sym typeface="Courier New"/>
-              </a:rPr>
-            </a:br>
-            <a:r>
-              <a:rPr lang="en-US" sz="1500" b="1">
-                <a:solidFill>
-                  <a:srgbClr val="CC00CC"/>
-                </a:solidFill>
-                <a:latin typeface="Courier New"/>
-                <a:ea typeface="Courier New"/>
-                <a:cs typeface="Courier New"/>
-                <a:sym typeface="Courier New"/>
-              </a:rPr>
-              <a:t>T_RPAREN 	  (“)”)</a:t>
-            </a:r>
-            <a:br>
-              <a:rPr lang="en-US" sz="1500" b="1">
-                <a:solidFill>
-                  <a:srgbClr val="CC00CC"/>
-                </a:solidFill>
-                <a:latin typeface="Courier New"/>
-                <a:ea typeface="Courier New"/>
-                <a:cs typeface="Courier New"/>
-                <a:sym typeface="Courier New"/>
-              </a:rPr>
-            </a:br>
-            <a:r>
-              <a:rPr lang="en-US" sz="1500" b="1">
-                <a:solidFill>
-                  <a:srgbClr val="CC00CC"/>
-                </a:solidFill>
-                <a:latin typeface="Courier New"/>
-                <a:ea typeface="Courier New"/>
-                <a:cs typeface="Courier New"/>
-                <a:sym typeface="Courier New"/>
-              </a:rPr>
-              <a:t>T_SEP 	  (“;”)</a:t>
-            </a:r>
-          </a:p>
-        </p:txBody>
-      </p:sp>
-      <p:sp>
-        <p:nvSpPr>
           <p:cNvPr id="6" name="Shape 253">
             <a:extLst>
               <a:ext uri="{FF2B5EF4-FFF2-40B4-BE49-F238E27FC236}">
@@ -7458,10 +7245,893 @@
               <a:rPr lang="en-US" smtClean="0"/>
               <a:t>10</a:t>
             </a:fld>
-            <a:endParaRPr lang="en-US"/>
-          </a:p>
-        </p:txBody>
-      </p:sp>
+            <a:endParaRPr lang="en-US" dirty="0"/>
+          </a:p>
+        </p:txBody>
+      </p:sp>
+      <p:grpSp>
+        <p:nvGrpSpPr>
+          <p:cNvPr id="29" name="Group 28">
+            <a:extLst>
+              <a:ext uri="{FF2B5EF4-FFF2-40B4-BE49-F238E27FC236}">
+                <a16:creationId xmlns:a16="http://schemas.microsoft.com/office/drawing/2014/main" id="{98E829A3-B98B-BA43-972B-FA9878441649}"/>
+              </a:ext>
+            </a:extLst>
+          </p:cNvPr>
+          <p:cNvGrpSpPr/>
+          <p:nvPr/>
+        </p:nvGrpSpPr>
+        <p:grpSpPr>
+          <a:xfrm>
+            <a:off x="4829814" y="2101222"/>
+            <a:ext cx="2830121" cy="2748610"/>
+            <a:chOff x="4829814" y="2101222"/>
+            <a:chExt cx="2830121" cy="2748610"/>
+          </a:xfrm>
+        </p:grpSpPr>
+        <p:sp>
+          <p:nvSpPr>
+            <p:cNvPr id="11" name="TextBox 10">
+              <a:extLst>
+                <a:ext uri="{FF2B5EF4-FFF2-40B4-BE49-F238E27FC236}">
+                  <a16:creationId xmlns:a16="http://schemas.microsoft.com/office/drawing/2014/main" id="{5FA8384B-F84C-D643-8DFA-9B9B8232C58E}"/>
+                </a:ext>
+              </a:extLst>
+            </p:cNvPr>
+            <p:cNvSpPr txBox="1"/>
+            <p:nvPr/>
+          </p:nvSpPr>
+          <p:spPr>
+            <a:xfrm>
+              <a:off x="4829814" y="2101222"/>
+              <a:ext cx="1043876" cy="307777"/>
+            </a:xfrm>
+            <a:prstGeom prst="rect">
+              <a:avLst/>
+            </a:prstGeom>
+            <a:noFill/>
+          </p:spPr>
+          <p:txBody>
+            <a:bodyPr wrap="none" rtlCol="0">
+              <a:spAutoFit/>
+            </a:bodyPr>
+            <a:lstStyle/>
+            <a:p>
+              <a:r>
+                <a:rPr lang="en-US" b="1" dirty="0">
+                  <a:solidFill>
+                    <a:srgbClr val="CC00CC"/>
+                  </a:solidFill>
+                  <a:latin typeface="Courier New"/>
+                  <a:ea typeface="Courier New"/>
+                  <a:cs typeface="Courier New"/>
+                  <a:sym typeface="Courier New"/>
+                </a:rPr>
+                <a:t>T_DOUBLE</a:t>
+              </a:r>
+            </a:p>
+          </p:txBody>
+        </p:sp>
+        <p:sp>
+          <p:nvSpPr>
+            <p:cNvPr id="12" name="TextBox 11">
+              <a:extLst>
+                <a:ext uri="{FF2B5EF4-FFF2-40B4-BE49-F238E27FC236}">
+                  <a16:creationId xmlns:a16="http://schemas.microsoft.com/office/drawing/2014/main" id="{20AEB69F-651E-AA49-A474-9C562B53C2CB}"/>
+                </a:ext>
+              </a:extLst>
+            </p:cNvPr>
+            <p:cNvSpPr txBox="1"/>
+            <p:nvPr/>
+          </p:nvSpPr>
+          <p:spPr>
+            <a:xfrm>
+              <a:off x="6401257" y="2101222"/>
+              <a:ext cx="1258678" cy="307777"/>
+            </a:xfrm>
+            <a:prstGeom prst="rect">
+              <a:avLst/>
+            </a:prstGeom>
+            <a:noFill/>
+          </p:spPr>
+          <p:txBody>
+            <a:bodyPr wrap="none" rtlCol="0">
+              <a:spAutoFit/>
+            </a:bodyPr>
+            <a:lstStyle/>
+            <a:p>
+              <a:r>
+                <a:rPr lang="en-US" b="1" dirty="0">
+                  <a:solidFill>
+                    <a:srgbClr val="CC00CC"/>
+                  </a:solidFill>
+                  <a:latin typeface="Courier New"/>
+                  <a:ea typeface="Courier New"/>
+                  <a:cs typeface="Courier New"/>
+                  <a:sym typeface="Courier New"/>
+                </a:rPr>
+                <a:t>(“double”)</a:t>
+              </a:r>
+            </a:p>
+          </p:txBody>
+        </p:sp>
+        <p:sp>
+          <p:nvSpPr>
+            <p:cNvPr id="13" name="TextBox 12">
+              <a:extLst>
+                <a:ext uri="{FF2B5EF4-FFF2-40B4-BE49-F238E27FC236}">
+                  <a16:creationId xmlns:a16="http://schemas.microsoft.com/office/drawing/2014/main" id="{F9E244BC-9324-A74E-B5A2-4C8AB1A98E81}"/>
+                </a:ext>
+              </a:extLst>
+            </p:cNvPr>
+            <p:cNvSpPr txBox="1"/>
+            <p:nvPr/>
+          </p:nvSpPr>
+          <p:spPr>
+            <a:xfrm>
+              <a:off x="4829814" y="2406326"/>
+              <a:ext cx="936475" cy="307777"/>
+            </a:xfrm>
+            <a:prstGeom prst="rect">
+              <a:avLst/>
+            </a:prstGeom>
+            <a:noFill/>
+          </p:spPr>
+          <p:txBody>
+            <a:bodyPr wrap="none" rtlCol="0">
+              <a:spAutoFit/>
+            </a:bodyPr>
+            <a:lstStyle/>
+            <a:p>
+              <a:pPr>
+                <a:spcBef>
+                  <a:spcPts val="600"/>
+                </a:spcBef>
+                <a:buSzPct val="25000"/>
+              </a:pPr>
+              <a:r>
+                <a:rPr lang="en-US" b="1" dirty="0">
+                  <a:solidFill>
+                    <a:srgbClr val="CC00CC"/>
+                  </a:solidFill>
+                  <a:latin typeface="Courier New"/>
+                  <a:ea typeface="Courier New"/>
+                  <a:cs typeface="Courier New"/>
+                  <a:sym typeface="Courier New"/>
+                </a:rPr>
+                <a:t>T_IDENT</a:t>
+              </a:r>
+            </a:p>
+          </p:txBody>
+        </p:sp>
+        <p:sp>
+          <p:nvSpPr>
+            <p:cNvPr id="14" name="TextBox 13">
+              <a:extLst>
+                <a:ext uri="{FF2B5EF4-FFF2-40B4-BE49-F238E27FC236}">
+                  <a16:creationId xmlns:a16="http://schemas.microsoft.com/office/drawing/2014/main" id="{96F08C71-23B6-CA4C-AB54-7A0D936C8D9E}"/>
+                </a:ext>
+              </a:extLst>
+            </p:cNvPr>
+            <p:cNvSpPr txBox="1"/>
+            <p:nvPr/>
+          </p:nvSpPr>
+          <p:spPr>
+            <a:xfrm>
+              <a:off x="6401257" y="2406326"/>
+              <a:ext cx="721672" cy="307777"/>
+            </a:xfrm>
+            <a:prstGeom prst="rect">
+              <a:avLst/>
+            </a:prstGeom>
+            <a:noFill/>
+          </p:spPr>
+          <p:txBody>
+            <a:bodyPr wrap="none" rtlCol="0">
+              <a:spAutoFit/>
+            </a:bodyPr>
+            <a:lstStyle/>
+            <a:p>
+              <a:pPr>
+                <a:spcBef>
+                  <a:spcPts val="600"/>
+                </a:spcBef>
+              </a:pPr>
+              <a:r>
+                <a:rPr lang="en-US" b="1" dirty="0">
+                  <a:solidFill>
+                    <a:srgbClr val="CC00CC"/>
+                  </a:solidFill>
+                  <a:latin typeface="Courier New"/>
+                  <a:ea typeface="Courier New"/>
+                  <a:cs typeface="Courier New"/>
+                  <a:sym typeface="Courier New"/>
+                </a:rPr>
+                <a:t>(“f”)</a:t>
+              </a:r>
+            </a:p>
+          </p:txBody>
+        </p:sp>
+        <p:sp>
+          <p:nvSpPr>
+            <p:cNvPr id="15" name="TextBox 14">
+              <a:extLst>
+                <a:ext uri="{FF2B5EF4-FFF2-40B4-BE49-F238E27FC236}">
+                  <a16:creationId xmlns:a16="http://schemas.microsoft.com/office/drawing/2014/main" id="{E254D553-FC3E-ED42-94C7-734D45FB5FCA}"/>
+                </a:ext>
+              </a:extLst>
+            </p:cNvPr>
+            <p:cNvSpPr txBox="1"/>
+            <p:nvPr/>
+          </p:nvSpPr>
+          <p:spPr>
+            <a:xfrm>
+              <a:off x="4829814" y="2711430"/>
+              <a:ext cx="614271" cy="307777"/>
+            </a:xfrm>
+            <a:prstGeom prst="rect">
+              <a:avLst/>
+            </a:prstGeom>
+            <a:noFill/>
+          </p:spPr>
+          <p:txBody>
+            <a:bodyPr wrap="none" rtlCol="0">
+              <a:spAutoFit/>
+            </a:bodyPr>
+            <a:lstStyle/>
+            <a:p>
+              <a:pPr>
+                <a:spcBef>
+                  <a:spcPts val="600"/>
+                </a:spcBef>
+                <a:buSzPct val="25000"/>
+              </a:pPr>
+              <a:r>
+                <a:rPr lang="en-US" b="1" dirty="0">
+                  <a:solidFill>
+                    <a:srgbClr val="CC00CC"/>
+                  </a:solidFill>
+                  <a:latin typeface="Courier New"/>
+                  <a:ea typeface="Courier New"/>
+                  <a:cs typeface="Courier New"/>
+                  <a:sym typeface="Courier New"/>
+                </a:rPr>
+                <a:t>T_OP</a:t>
+              </a:r>
+            </a:p>
+          </p:txBody>
+        </p:sp>
+        <p:sp>
+          <p:nvSpPr>
+            <p:cNvPr id="16" name="TextBox 15">
+              <a:extLst>
+                <a:ext uri="{FF2B5EF4-FFF2-40B4-BE49-F238E27FC236}">
+                  <a16:creationId xmlns:a16="http://schemas.microsoft.com/office/drawing/2014/main" id="{8D7AA325-20B2-FE4B-BA58-B9F237F6D174}"/>
+                </a:ext>
+              </a:extLst>
+            </p:cNvPr>
+            <p:cNvSpPr txBox="1"/>
+            <p:nvPr/>
+          </p:nvSpPr>
+          <p:spPr>
+            <a:xfrm>
+              <a:off x="6401257" y="2711430"/>
+              <a:ext cx="721672" cy="307777"/>
+            </a:xfrm>
+            <a:prstGeom prst="rect">
+              <a:avLst/>
+            </a:prstGeom>
+            <a:noFill/>
+          </p:spPr>
+          <p:txBody>
+            <a:bodyPr wrap="none" rtlCol="0">
+              <a:spAutoFit/>
+            </a:bodyPr>
+            <a:lstStyle/>
+            <a:p>
+              <a:pPr>
+                <a:spcBef>
+                  <a:spcPts val="600"/>
+                </a:spcBef>
+              </a:pPr>
+              <a:r>
+                <a:rPr lang="en-US" b="1" dirty="0">
+                  <a:solidFill>
+                    <a:srgbClr val="CC00CC"/>
+                  </a:solidFill>
+                  <a:latin typeface="Courier New"/>
+                  <a:ea typeface="Courier New"/>
+                  <a:cs typeface="Courier New"/>
+                  <a:sym typeface="Courier New"/>
+                </a:rPr>
+                <a:t>(“=”)</a:t>
+              </a:r>
+            </a:p>
+          </p:txBody>
+        </p:sp>
+        <p:sp>
+          <p:nvSpPr>
+            <p:cNvPr id="17" name="TextBox 16">
+              <a:extLst>
+                <a:ext uri="{FF2B5EF4-FFF2-40B4-BE49-F238E27FC236}">
+                  <a16:creationId xmlns:a16="http://schemas.microsoft.com/office/drawing/2014/main" id="{C46D3FAD-9CC3-1142-B3E6-5C41817FDA49}"/>
+                </a:ext>
+              </a:extLst>
+            </p:cNvPr>
+            <p:cNvSpPr txBox="1"/>
+            <p:nvPr/>
+          </p:nvSpPr>
+          <p:spPr>
+            <a:xfrm>
+              <a:off x="4829814" y="3016534"/>
+              <a:ext cx="936475" cy="307777"/>
+            </a:xfrm>
+            <a:prstGeom prst="rect">
+              <a:avLst/>
+            </a:prstGeom>
+            <a:noFill/>
+          </p:spPr>
+          <p:txBody>
+            <a:bodyPr wrap="none" rtlCol="0">
+              <a:spAutoFit/>
+            </a:bodyPr>
+            <a:lstStyle/>
+            <a:p>
+              <a:pPr>
+                <a:spcBef>
+                  <a:spcPts val="600"/>
+                </a:spcBef>
+                <a:buSzPct val="25000"/>
+              </a:pPr>
+              <a:r>
+                <a:rPr lang="en-US" b="1" dirty="0">
+                  <a:solidFill>
+                    <a:srgbClr val="CC00CC"/>
+                  </a:solidFill>
+                  <a:latin typeface="Courier New"/>
+                  <a:ea typeface="Courier New"/>
+                  <a:cs typeface="Courier New"/>
+                  <a:sym typeface="Courier New"/>
+                </a:rPr>
+                <a:t>T_IDENT</a:t>
+              </a:r>
+            </a:p>
+          </p:txBody>
+        </p:sp>
+        <p:sp>
+          <p:nvSpPr>
+            <p:cNvPr id="18" name="TextBox 17">
+              <a:extLst>
+                <a:ext uri="{FF2B5EF4-FFF2-40B4-BE49-F238E27FC236}">
+                  <a16:creationId xmlns:a16="http://schemas.microsoft.com/office/drawing/2014/main" id="{78720134-FD08-364E-891F-3EEA3916893E}"/>
+                </a:ext>
+              </a:extLst>
+            </p:cNvPr>
+            <p:cNvSpPr txBox="1"/>
+            <p:nvPr/>
+          </p:nvSpPr>
+          <p:spPr>
+            <a:xfrm>
+              <a:off x="6401257" y="3016534"/>
+              <a:ext cx="1043876" cy="307777"/>
+            </a:xfrm>
+            <a:prstGeom prst="rect">
+              <a:avLst/>
+            </a:prstGeom>
+            <a:noFill/>
+          </p:spPr>
+          <p:txBody>
+            <a:bodyPr wrap="none" rtlCol="0">
+              <a:spAutoFit/>
+            </a:bodyPr>
+            <a:lstStyle/>
+            <a:p>
+              <a:pPr>
+                <a:spcBef>
+                  <a:spcPts val="600"/>
+                </a:spcBef>
+              </a:pPr>
+              <a:r>
+                <a:rPr lang="en-US" b="1" dirty="0">
+                  <a:solidFill>
+                    <a:srgbClr val="CC00CC"/>
+                  </a:solidFill>
+                  <a:latin typeface="Courier New"/>
+                  <a:ea typeface="Courier New"/>
+                  <a:cs typeface="Courier New"/>
+                  <a:sym typeface="Courier New"/>
+                </a:rPr>
+                <a:t>(“sqrt”)</a:t>
+              </a:r>
+            </a:p>
+          </p:txBody>
+        </p:sp>
+        <p:sp>
+          <p:nvSpPr>
+            <p:cNvPr id="19" name="TextBox 18">
+              <a:extLst>
+                <a:ext uri="{FF2B5EF4-FFF2-40B4-BE49-F238E27FC236}">
+                  <a16:creationId xmlns:a16="http://schemas.microsoft.com/office/drawing/2014/main" id="{C59C0786-6457-D84F-8CA5-568D922DFC3C}"/>
+                </a:ext>
+              </a:extLst>
+            </p:cNvPr>
+            <p:cNvSpPr txBox="1"/>
+            <p:nvPr/>
+          </p:nvSpPr>
+          <p:spPr>
+            <a:xfrm>
+              <a:off x="4829814" y="3321638"/>
+              <a:ext cx="1043876" cy="307777"/>
+            </a:xfrm>
+            <a:prstGeom prst="rect">
+              <a:avLst/>
+            </a:prstGeom>
+            <a:noFill/>
+          </p:spPr>
+          <p:txBody>
+            <a:bodyPr wrap="none" rtlCol="0">
+              <a:spAutoFit/>
+            </a:bodyPr>
+            <a:lstStyle/>
+            <a:p>
+              <a:pPr>
+                <a:spcBef>
+                  <a:spcPts val="600"/>
+                </a:spcBef>
+                <a:buSzPct val="25000"/>
+              </a:pPr>
+              <a:r>
+                <a:rPr lang="en-US" b="1" dirty="0">
+                  <a:solidFill>
+                    <a:srgbClr val="CC00CC"/>
+                  </a:solidFill>
+                  <a:latin typeface="Courier New"/>
+                  <a:ea typeface="Courier New"/>
+                  <a:cs typeface="Courier New"/>
+                  <a:sym typeface="Courier New"/>
+                </a:rPr>
+                <a:t>T_LPAREN</a:t>
+              </a:r>
+            </a:p>
+          </p:txBody>
+        </p:sp>
+        <p:sp>
+          <p:nvSpPr>
+            <p:cNvPr id="20" name="TextBox 19">
+              <a:extLst>
+                <a:ext uri="{FF2B5EF4-FFF2-40B4-BE49-F238E27FC236}">
+                  <a16:creationId xmlns:a16="http://schemas.microsoft.com/office/drawing/2014/main" id="{862218F2-97EA-7C4E-86F8-EB9EA45881B4}"/>
+                </a:ext>
+              </a:extLst>
+            </p:cNvPr>
+            <p:cNvSpPr txBox="1"/>
+            <p:nvPr/>
+          </p:nvSpPr>
+          <p:spPr>
+            <a:xfrm>
+              <a:off x="6401257" y="3321638"/>
+              <a:ext cx="721672" cy="307777"/>
+            </a:xfrm>
+            <a:prstGeom prst="rect">
+              <a:avLst/>
+            </a:prstGeom>
+            <a:noFill/>
+          </p:spPr>
+          <p:txBody>
+            <a:bodyPr wrap="none" rtlCol="0">
+              <a:spAutoFit/>
+            </a:bodyPr>
+            <a:lstStyle/>
+            <a:p>
+              <a:pPr>
+                <a:spcBef>
+                  <a:spcPts val="600"/>
+                </a:spcBef>
+              </a:pPr>
+              <a:r>
+                <a:rPr lang="en-US" b="1" dirty="0">
+                  <a:solidFill>
+                    <a:srgbClr val="CC00CC"/>
+                  </a:solidFill>
+                  <a:latin typeface="Courier New"/>
+                  <a:ea typeface="Courier New"/>
+                  <a:cs typeface="Courier New"/>
+                  <a:sym typeface="Courier New"/>
+                </a:rPr>
+                <a:t>(“(”)</a:t>
+              </a:r>
+            </a:p>
+          </p:txBody>
+        </p:sp>
+        <p:sp>
+          <p:nvSpPr>
+            <p:cNvPr id="21" name="TextBox 20">
+              <a:extLst>
+                <a:ext uri="{FF2B5EF4-FFF2-40B4-BE49-F238E27FC236}">
+                  <a16:creationId xmlns:a16="http://schemas.microsoft.com/office/drawing/2014/main" id="{977F820E-A597-3347-A72B-FE2B1263EBA5}"/>
+                </a:ext>
+              </a:extLst>
+            </p:cNvPr>
+            <p:cNvSpPr txBox="1"/>
+            <p:nvPr/>
+          </p:nvSpPr>
+          <p:spPr>
+            <a:xfrm>
+              <a:off x="4829814" y="3626742"/>
+              <a:ext cx="614271" cy="307777"/>
+            </a:xfrm>
+            <a:prstGeom prst="rect">
+              <a:avLst/>
+            </a:prstGeom>
+            <a:noFill/>
+          </p:spPr>
+          <p:txBody>
+            <a:bodyPr wrap="none" rtlCol="0">
+              <a:spAutoFit/>
+            </a:bodyPr>
+            <a:lstStyle/>
+            <a:p>
+              <a:pPr>
+                <a:spcBef>
+                  <a:spcPts val="600"/>
+                </a:spcBef>
+                <a:buSzPct val="25000"/>
+              </a:pPr>
+              <a:r>
+                <a:rPr lang="en-US" b="1" dirty="0">
+                  <a:solidFill>
+                    <a:srgbClr val="CC00CC"/>
+                  </a:solidFill>
+                  <a:latin typeface="Courier New"/>
+                  <a:ea typeface="Courier New"/>
+                  <a:cs typeface="Courier New"/>
+                  <a:sym typeface="Courier New"/>
+                </a:rPr>
+                <a:t>T_OP</a:t>
+              </a:r>
+            </a:p>
+          </p:txBody>
+        </p:sp>
+        <p:sp>
+          <p:nvSpPr>
+            <p:cNvPr id="22" name="TextBox 21">
+              <a:extLst>
+                <a:ext uri="{FF2B5EF4-FFF2-40B4-BE49-F238E27FC236}">
+                  <a16:creationId xmlns:a16="http://schemas.microsoft.com/office/drawing/2014/main" id="{74D26130-CD1B-7F40-86E3-AEE04A357517}"/>
+                </a:ext>
+              </a:extLst>
+            </p:cNvPr>
+            <p:cNvSpPr txBox="1"/>
+            <p:nvPr/>
+          </p:nvSpPr>
+          <p:spPr>
+            <a:xfrm>
+              <a:off x="6401257" y="3626742"/>
+              <a:ext cx="721672" cy="307777"/>
+            </a:xfrm>
+            <a:prstGeom prst="rect">
+              <a:avLst/>
+            </a:prstGeom>
+            <a:noFill/>
+          </p:spPr>
+          <p:txBody>
+            <a:bodyPr wrap="none" rtlCol="0">
+              <a:spAutoFit/>
+            </a:bodyPr>
+            <a:lstStyle/>
+            <a:p>
+              <a:pPr>
+                <a:spcBef>
+                  <a:spcPts val="600"/>
+                </a:spcBef>
+              </a:pPr>
+              <a:r>
+                <a:rPr lang="en-US" b="1" dirty="0">
+                  <a:solidFill>
+                    <a:srgbClr val="CC00CC"/>
+                  </a:solidFill>
+                  <a:latin typeface="Courier New"/>
+                  <a:ea typeface="Courier New"/>
+                  <a:cs typeface="Courier New"/>
+                  <a:sym typeface="Courier New"/>
+                </a:rPr>
+                <a:t>(“-”)</a:t>
+              </a:r>
+            </a:p>
+          </p:txBody>
+        </p:sp>
+        <p:sp>
+          <p:nvSpPr>
+            <p:cNvPr id="23" name="TextBox 22">
+              <a:extLst>
+                <a:ext uri="{FF2B5EF4-FFF2-40B4-BE49-F238E27FC236}">
+                  <a16:creationId xmlns:a16="http://schemas.microsoft.com/office/drawing/2014/main" id="{D55DB48E-6E91-AD43-8CEE-5AD8D2D053B0}"/>
+                </a:ext>
+              </a:extLst>
+            </p:cNvPr>
+            <p:cNvSpPr txBox="1"/>
+            <p:nvPr/>
+          </p:nvSpPr>
+          <p:spPr>
+            <a:xfrm>
+              <a:off x="4829814" y="3931846"/>
+              <a:ext cx="1580882" cy="307777"/>
+            </a:xfrm>
+            <a:prstGeom prst="rect">
+              <a:avLst/>
+            </a:prstGeom>
+            <a:noFill/>
+          </p:spPr>
+          <p:txBody>
+            <a:bodyPr wrap="none" rtlCol="0">
+              <a:spAutoFit/>
+            </a:bodyPr>
+            <a:lstStyle/>
+            <a:p>
+              <a:pPr>
+                <a:spcBef>
+                  <a:spcPts val="600"/>
+                </a:spcBef>
+                <a:buSzPct val="25000"/>
+              </a:pPr>
+              <a:r>
+                <a:rPr lang="en-US" b="1" dirty="0">
+                  <a:solidFill>
+                    <a:srgbClr val="CC00CC"/>
+                  </a:solidFill>
+                  <a:latin typeface="Courier New"/>
+                  <a:ea typeface="Courier New"/>
+                  <a:cs typeface="Courier New"/>
+                  <a:sym typeface="Courier New"/>
+                </a:rPr>
+                <a:t>T_INTCONSTANT</a:t>
+              </a:r>
+            </a:p>
+          </p:txBody>
+        </p:sp>
+        <p:sp>
+          <p:nvSpPr>
+            <p:cNvPr id="24" name="TextBox 23">
+              <a:extLst>
+                <a:ext uri="{FF2B5EF4-FFF2-40B4-BE49-F238E27FC236}">
+                  <a16:creationId xmlns:a16="http://schemas.microsoft.com/office/drawing/2014/main" id="{4554561E-BB9F-A844-B651-177E5456B6B9}"/>
+                </a:ext>
+              </a:extLst>
+            </p:cNvPr>
+            <p:cNvSpPr txBox="1"/>
+            <p:nvPr/>
+          </p:nvSpPr>
+          <p:spPr>
+            <a:xfrm>
+              <a:off x="6401257" y="3931846"/>
+              <a:ext cx="721672" cy="307777"/>
+            </a:xfrm>
+            <a:prstGeom prst="rect">
+              <a:avLst/>
+            </a:prstGeom>
+            <a:noFill/>
+          </p:spPr>
+          <p:txBody>
+            <a:bodyPr wrap="none" rtlCol="0">
+              <a:spAutoFit/>
+            </a:bodyPr>
+            <a:lstStyle/>
+            <a:p>
+              <a:pPr>
+                <a:spcBef>
+                  <a:spcPts val="600"/>
+                </a:spcBef>
+              </a:pPr>
+              <a:r>
+                <a:rPr lang="en-US" b="1" dirty="0">
+                  <a:solidFill>
+                    <a:srgbClr val="CC00CC"/>
+                  </a:solidFill>
+                  <a:latin typeface="Courier New"/>
+                  <a:ea typeface="Courier New"/>
+                  <a:cs typeface="Courier New"/>
+                  <a:sym typeface="Courier New"/>
+                </a:rPr>
+                <a:t>(“1”)</a:t>
+              </a:r>
+            </a:p>
+          </p:txBody>
+        </p:sp>
+        <p:sp>
+          <p:nvSpPr>
+            <p:cNvPr id="25" name="TextBox 24">
+              <a:extLst>
+                <a:ext uri="{FF2B5EF4-FFF2-40B4-BE49-F238E27FC236}">
+                  <a16:creationId xmlns:a16="http://schemas.microsoft.com/office/drawing/2014/main" id="{ABB8BC22-5C4D-EE48-B236-6D88D81217BB}"/>
+                </a:ext>
+              </a:extLst>
+            </p:cNvPr>
+            <p:cNvSpPr txBox="1"/>
+            <p:nvPr/>
+          </p:nvSpPr>
+          <p:spPr>
+            <a:xfrm>
+              <a:off x="4829814" y="4236950"/>
+              <a:ext cx="1043876" cy="307777"/>
+            </a:xfrm>
+            <a:prstGeom prst="rect">
+              <a:avLst/>
+            </a:prstGeom>
+            <a:noFill/>
+          </p:spPr>
+          <p:txBody>
+            <a:bodyPr wrap="none" rtlCol="0">
+              <a:spAutoFit/>
+            </a:bodyPr>
+            <a:lstStyle/>
+            <a:p>
+              <a:pPr>
+                <a:spcBef>
+                  <a:spcPts val="600"/>
+                </a:spcBef>
+                <a:buSzPct val="25000"/>
+              </a:pPr>
+              <a:r>
+                <a:rPr lang="en-US" b="1" dirty="0">
+                  <a:solidFill>
+                    <a:srgbClr val="CC00CC"/>
+                  </a:solidFill>
+                  <a:latin typeface="Courier New"/>
+                  <a:ea typeface="Courier New"/>
+                  <a:cs typeface="Courier New"/>
+                  <a:sym typeface="Courier New"/>
+                </a:rPr>
+                <a:t>T_RPAREN</a:t>
+              </a:r>
+            </a:p>
+          </p:txBody>
+        </p:sp>
+        <p:sp>
+          <p:nvSpPr>
+            <p:cNvPr id="26" name="TextBox 25">
+              <a:extLst>
+                <a:ext uri="{FF2B5EF4-FFF2-40B4-BE49-F238E27FC236}">
+                  <a16:creationId xmlns:a16="http://schemas.microsoft.com/office/drawing/2014/main" id="{B235A9C0-8ACB-D84F-B34A-7146F4A9E1C0}"/>
+                </a:ext>
+              </a:extLst>
+            </p:cNvPr>
+            <p:cNvSpPr txBox="1"/>
+            <p:nvPr/>
+          </p:nvSpPr>
+          <p:spPr>
+            <a:xfrm>
+              <a:off x="6401257" y="4236950"/>
+              <a:ext cx="721672" cy="307777"/>
+            </a:xfrm>
+            <a:prstGeom prst="rect">
+              <a:avLst/>
+            </a:prstGeom>
+            <a:noFill/>
+          </p:spPr>
+          <p:txBody>
+            <a:bodyPr wrap="none" rtlCol="0">
+              <a:spAutoFit/>
+            </a:bodyPr>
+            <a:lstStyle/>
+            <a:p>
+              <a:pPr>
+                <a:spcBef>
+                  <a:spcPts val="600"/>
+                </a:spcBef>
+              </a:pPr>
+              <a:r>
+                <a:rPr lang="en-US" b="1" dirty="0">
+                  <a:solidFill>
+                    <a:srgbClr val="CC00CC"/>
+                  </a:solidFill>
+                  <a:latin typeface="Courier New"/>
+                  <a:ea typeface="Courier New"/>
+                  <a:cs typeface="Courier New"/>
+                  <a:sym typeface="Courier New"/>
+                </a:rPr>
+                <a:t>(“)”)</a:t>
+              </a:r>
+            </a:p>
+          </p:txBody>
+        </p:sp>
+        <p:sp>
+          <p:nvSpPr>
+            <p:cNvPr id="27" name="TextBox 26">
+              <a:extLst>
+                <a:ext uri="{FF2B5EF4-FFF2-40B4-BE49-F238E27FC236}">
+                  <a16:creationId xmlns:a16="http://schemas.microsoft.com/office/drawing/2014/main" id="{1843B2DC-C433-8F45-960B-F3878350D60F}"/>
+                </a:ext>
+              </a:extLst>
+            </p:cNvPr>
+            <p:cNvSpPr txBox="1"/>
+            <p:nvPr/>
+          </p:nvSpPr>
+          <p:spPr>
+            <a:xfrm>
+              <a:off x="4829814" y="4542055"/>
+              <a:ext cx="721672" cy="307777"/>
+            </a:xfrm>
+            <a:prstGeom prst="rect">
+              <a:avLst/>
+            </a:prstGeom>
+            <a:noFill/>
+          </p:spPr>
+          <p:txBody>
+            <a:bodyPr wrap="none" rtlCol="0">
+              <a:spAutoFit/>
+            </a:bodyPr>
+            <a:lstStyle/>
+            <a:p>
+              <a:pPr>
+                <a:spcBef>
+                  <a:spcPts val="600"/>
+                </a:spcBef>
+                <a:buSzPct val="25000"/>
+              </a:pPr>
+              <a:r>
+                <a:rPr lang="en-US" b="1" dirty="0">
+                  <a:solidFill>
+                    <a:srgbClr val="CC00CC"/>
+                  </a:solidFill>
+                  <a:latin typeface="Courier New"/>
+                  <a:ea typeface="Courier New"/>
+                  <a:cs typeface="Courier New"/>
+                  <a:sym typeface="Courier New"/>
+                </a:rPr>
+                <a:t>T_SEP</a:t>
+              </a:r>
+            </a:p>
+          </p:txBody>
+        </p:sp>
+        <p:sp>
+          <p:nvSpPr>
+            <p:cNvPr id="28" name="TextBox 27">
+              <a:extLst>
+                <a:ext uri="{FF2B5EF4-FFF2-40B4-BE49-F238E27FC236}">
+                  <a16:creationId xmlns:a16="http://schemas.microsoft.com/office/drawing/2014/main" id="{01B5125A-8501-6440-BD1F-33DC8A9A3953}"/>
+                </a:ext>
+              </a:extLst>
+            </p:cNvPr>
+            <p:cNvSpPr txBox="1"/>
+            <p:nvPr/>
+          </p:nvSpPr>
+          <p:spPr>
+            <a:xfrm>
+              <a:off x="6401257" y="4542055"/>
+              <a:ext cx="721672" cy="307777"/>
+            </a:xfrm>
+            <a:prstGeom prst="rect">
+              <a:avLst/>
+            </a:prstGeom>
+            <a:noFill/>
+          </p:spPr>
+          <p:txBody>
+            <a:bodyPr wrap="none" rtlCol="0">
+              <a:spAutoFit/>
+            </a:bodyPr>
+            <a:lstStyle/>
+            <a:p>
+              <a:pPr>
+                <a:spcBef>
+                  <a:spcPts val="600"/>
+                </a:spcBef>
+              </a:pPr>
+              <a:r>
+                <a:rPr lang="en-US" b="1" dirty="0">
+                  <a:solidFill>
+                    <a:srgbClr val="CC00CC"/>
+                  </a:solidFill>
+                  <a:latin typeface="Courier New"/>
+                  <a:ea typeface="Courier New"/>
+                  <a:cs typeface="Courier New"/>
+                  <a:sym typeface="Courier New"/>
+                </a:rPr>
+                <a:t>(“;”)</a:t>
+              </a:r>
+            </a:p>
+          </p:txBody>
+        </p:sp>
+      </p:grpSp>
     </p:spTree>
     <p:extLst>
       <p:ext uri="{BB962C8B-B14F-4D97-AF65-F5344CB8AC3E}">
@@ -9410,6 +10080,341 @@
   <p:clrMapOvr>
     <a:masterClrMapping/>
   </p:clrMapOvr>
+  <p:timing>
+    <p:tnLst>
+      <p:par>
+        <p:cTn id="1" dur="indefinite" restart="never" nodeType="tmRoot">
+          <p:childTnLst>
+            <p:seq concurrent="1" nextAc="seek">
+              <p:cTn id="2" dur="indefinite" nodeType="mainSeq">
+                <p:childTnLst>
+                  <p:par>
+                    <p:cTn id="3" fill="hold">
+                      <p:stCondLst>
+                        <p:cond delay="indefinite"/>
+                      </p:stCondLst>
+                      <p:childTnLst>
+                        <p:par>
+                          <p:cTn id="4" fill="hold">
+                            <p:stCondLst>
+                              <p:cond delay="0"/>
+                            </p:stCondLst>
+                            <p:childTnLst>
+                              <p:par>
+                                <p:cTn id="5" presetID="1" presetClass="entr" presetSubtype="0" fill="hold" grpId="0" nodeType="clickEffect">
+                                  <p:stCondLst>
+                                    <p:cond delay="0"/>
+                                  </p:stCondLst>
+                                  <p:childTnLst>
+                                    <p:set>
+                                      <p:cBhvr>
+                                        <p:cTn id="6" dur="1" fill="hold">
+                                          <p:stCondLst>
+                                            <p:cond delay="0"/>
+                                          </p:stCondLst>
+                                        </p:cTn>
+                                        <p:tgtEl>
+                                          <p:spTgt spid="3">
+                                            <p:txEl>
+                                              <p:pRg st="0" end="0"/>
+                                            </p:txEl>
+                                          </p:spTgt>
+                                        </p:tgtEl>
+                                        <p:attrNameLst>
+                                          <p:attrName>style.visibility</p:attrName>
+                                        </p:attrNameLst>
+                                      </p:cBhvr>
+                                      <p:to>
+                                        <p:strVal val="visible"/>
+                                      </p:to>
+                                    </p:set>
+                                  </p:childTnLst>
+                                </p:cTn>
+                              </p:par>
+                              <p:par>
+                                <p:cTn id="7" presetID="1" presetClass="entr" presetSubtype="0" fill="hold" grpId="0" nodeType="withEffect">
+                                  <p:stCondLst>
+                                    <p:cond delay="0"/>
+                                  </p:stCondLst>
+                                  <p:childTnLst>
+                                    <p:set>
+                                      <p:cBhvr>
+                                        <p:cTn id="8" dur="1" fill="hold">
+                                          <p:stCondLst>
+                                            <p:cond delay="0"/>
+                                          </p:stCondLst>
+                                        </p:cTn>
+                                        <p:tgtEl>
+                                          <p:spTgt spid="3">
+                                            <p:txEl>
+                                              <p:pRg st="1" end="1"/>
+                                            </p:txEl>
+                                          </p:spTgt>
+                                        </p:tgtEl>
+                                        <p:attrNameLst>
+                                          <p:attrName>style.visibility</p:attrName>
+                                        </p:attrNameLst>
+                                      </p:cBhvr>
+                                      <p:to>
+                                        <p:strVal val="visible"/>
+                                      </p:to>
+                                    </p:set>
+                                  </p:childTnLst>
+                                </p:cTn>
+                              </p:par>
+                              <p:par>
+                                <p:cTn id="9" presetID="1" presetClass="entr" presetSubtype="0" fill="hold" grpId="0" nodeType="withEffect">
+                                  <p:stCondLst>
+                                    <p:cond delay="0"/>
+                                  </p:stCondLst>
+                                  <p:childTnLst>
+                                    <p:set>
+                                      <p:cBhvr>
+                                        <p:cTn id="10" dur="1" fill="hold">
+                                          <p:stCondLst>
+                                            <p:cond delay="0"/>
+                                          </p:stCondLst>
+                                        </p:cTn>
+                                        <p:tgtEl>
+                                          <p:spTgt spid="3">
+                                            <p:txEl>
+                                              <p:pRg st="2" end="2"/>
+                                            </p:txEl>
+                                          </p:spTgt>
+                                        </p:tgtEl>
+                                        <p:attrNameLst>
+                                          <p:attrName>style.visibility</p:attrName>
+                                        </p:attrNameLst>
+                                      </p:cBhvr>
+                                      <p:to>
+                                        <p:strVal val="visible"/>
+                                      </p:to>
+                                    </p:set>
+                                  </p:childTnLst>
+                                </p:cTn>
+                              </p:par>
+                              <p:par>
+                                <p:cTn id="11" presetID="1" presetClass="entr" presetSubtype="0" fill="hold" grpId="0" nodeType="withEffect">
+                                  <p:stCondLst>
+                                    <p:cond delay="0"/>
+                                  </p:stCondLst>
+                                  <p:childTnLst>
+                                    <p:set>
+                                      <p:cBhvr>
+                                        <p:cTn id="12" dur="1" fill="hold">
+                                          <p:stCondLst>
+                                            <p:cond delay="0"/>
+                                          </p:stCondLst>
+                                        </p:cTn>
+                                        <p:tgtEl>
+                                          <p:spTgt spid="3">
+                                            <p:txEl>
+                                              <p:pRg st="3" end="3"/>
+                                            </p:txEl>
+                                          </p:spTgt>
+                                        </p:tgtEl>
+                                        <p:attrNameLst>
+                                          <p:attrName>style.visibility</p:attrName>
+                                        </p:attrNameLst>
+                                      </p:cBhvr>
+                                      <p:to>
+                                        <p:strVal val="visible"/>
+                                      </p:to>
+                                    </p:set>
+                                  </p:childTnLst>
+                                </p:cTn>
+                              </p:par>
+                              <p:par>
+                                <p:cTn id="13" presetID="1" presetClass="entr" presetSubtype="0" fill="hold" grpId="0" nodeType="withEffect">
+                                  <p:stCondLst>
+                                    <p:cond delay="0"/>
+                                  </p:stCondLst>
+                                  <p:childTnLst>
+                                    <p:set>
+                                      <p:cBhvr>
+                                        <p:cTn id="14" dur="1" fill="hold">
+                                          <p:stCondLst>
+                                            <p:cond delay="0"/>
+                                          </p:stCondLst>
+                                        </p:cTn>
+                                        <p:tgtEl>
+                                          <p:spTgt spid="3">
+                                            <p:txEl>
+                                              <p:pRg st="4" end="4"/>
+                                            </p:txEl>
+                                          </p:spTgt>
+                                        </p:tgtEl>
+                                        <p:attrNameLst>
+                                          <p:attrName>style.visibility</p:attrName>
+                                        </p:attrNameLst>
+                                      </p:cBhvr>
+                                      <p:to>
+                                        <p:strVal val="visible"/>
+                                      </p:to>
+                                    </p:set>
+                                  </p:childTnLst>
+                                </p:cTn>
+                              </p:par>
+                            </p:childTnLst>
+                          </p:cTn>
+                        </p:par>
+                      </p:childTnLst>
+                    </p:cTn>
+                  </p:par>
+                  <p:par>
+                    <p:cTn id="15" fill="hold">
+                      <p:stCondLst>
+                        <p:cond delay="indefinite"/>
+                      </p:stCondLst>
+                      <p:childTnLst>
+                        <p:par>
+                          <p:cTn id="16" fill="hold">
+                            <p:stCondLst>
+                              <p:cond delay="0"/>
+                            </p:stCondLst>
+                            <p:childTnLst>
+                              <p:par>
+                                <p:cTn id="17" presetID="1" presetClass="entr" presetSubtype="0" fill="hold" grpId="0" nodeType="clickEffect">
+                                  <p:stCondLst>
+                                    <p:cond delay="0"/>
+                                  </p:stCondLst>
+                                  <p:childTnLst>
+                                    <p:set>
+                                      <p:cBhvr>
+                                        <p:cTn id="18" dur="1" fill="hold">
+                                          <p:stCondLst>
+                                            <p:cond delay="0"/>
+                                          </p:stCondLst>
+                                        </p:cTn>
+                                        <p:tgtEl>
+                                          <p:spTgt spid="3">
+                                            <p:txEl>
+                                              <p:pRg st="5" end="5"/>
+                                            </p:txEl>
+                                          </p:spTgt>
+                                        </p:tgtEl>
+                                        <p:attrNameLst>
+                                          <p:attrName>style.visibility</p:attrName>
+                                        </p:attrNameLst>
+                                      </p:cBhvr>
+                                      <p:to>
+                                        <p:strVal val="visible"/>
+                                      </p:to>
+                                    </p:set>
+                                  </p:childTnLst>
+                                </p:cTn>
+                              </p:par>
+                            </p:childTnLst>
+                          </p:cTn>
+                        </p:par>
+                      </p:childTnLst>
+                    </p:cTn>
+                  </p:par>
+                  <p:par>
+                    <p:cTn id="19" fill="hold">
+                      <p:stCondLst>
+                        <p:cond delay="indefinite"/>
+                      </p:stCondLst>
+                      <p:childTnLst>
+                        <p:par>
+                          <p:cTn id="20" fill="hold">
+                            <p:stCondLst>
+                              <p:cond delay="0"/>
+                            </p:stCondLst>
+                            <p:childTnLst>
+                              <p:par>
+                                <p:cTn id="21" presetID="1" presetClass="entr" presetSubtype="0" fill="hold" grpId="0" nodeType="clickEffect">
+                                  <p:stCondLst>
+                                    <p:cond delay="0"/>
+                                  </p:stCondLst>
+                                  <p:childTnLst>
+                                    <p:set>
+                                      <p:cBhvr>
+                                        <p:cTn id="22" dur="1" fill="hold">
+                                          <p:stCondLst>
+                                            <p:cond delay="0"/>
+                                          </p:stCondLst>
+                                        </p:cTn>
+                                        <p:tgtEl>
+                                          <p:spTgt spid="3">
+                                            <p:txEl>
+                                              <p:pRg st="6" end="6"/>
+                                            </p:txEl>
+                                          </p:spTgt>
+                                        </p:tgtEl>
+                                        <p:attrNameLst>
+                                          <p:attrName>style.visibility</p:attrName>
+                                        </p:attrNameLst>
+                                      </p:cBhvr>
+                                      <p:to>
+                                        <p:strVal val="visible"/>
+                                      </p:to>
+                                    </p:set>
+                                  </p:childTnLst>
+                                </p:cTn>
+                              </p:par>
+                              <p:par>
+                                <p:cTn id="23" presetID="1" presetClass="entr" presetSubtype="0" fill="hold" grpId="0" nodeType="withEffect">
+                                  <p:stCondLst>
+                                    <p:cond delay="0"/>
+                                  </p:stCondLst>
+                                  <p:childTnLst>
+                                    <p:set>
+                                      <p:cBhvr>
+                                        <p:cTn id="24" dur="1" fill="hold">
+                                          <p:stCondLst>
+                                            <p:cond delay="0"/>
+                                          </p:stCondLst>
+                                        </p:cTn>
+                                        <p:tgtEl>
+                                          <p:spTgt spid="3">
+                                            <p:txEl>
+                                              <p:pRg st="7" end="7"/>
+                                            </p:txEl>
+                                          </p:spTgt>
+                                        </p:tgtEl>
+                                        <p:attrNameLst>
+                                          <p:attrName>style.visibility</p:attrName>
+                                        </p:attrNameLst>
+                                      </p:cBhvr>
+                                      <p:to>
+                                        <p:strVal val="visible"/>
+                                      </p:to>
+                                    </p:set>
+                                  </p:childTnLst>
+                                </p:cTn>
+                              </p:par>
+                            </p:childTnLst>
+                          </p:cTn>
+                        </p:par>
+                      </p:childTnLst>
+                    </p:cTn>
+                  </p:par>
+                </p:childTnLst>
+              </p:cTn>
+              <p:prevCondLst>
+                <p:cond evt="onPrev" delay="0">
+                  <p:tgtEl>
+                    <p:sldTgt/>
+                  </p:tgtEl>
+                </p:cond>
+              </p:prevCondLst>
+              <p:nextCondLst>
+                <p:cond evt="onNext" delay="0">
+                  <p:tgtEl>
+                    <p:sldTgt/>
+                  </p:tgtEl>
+                </p:cond>
+              </p:nextCondLst>
+            </p:seq>
+          </p:childTnLst>
+        </p:cTn>
+      </p:par>
+    </p:tnLst>
+    <p:bldLst>
+      <p:bldP spid="3" grpId="0" build="p"/>
+    </p:bldLst>
+  </p:timing>
 </p:sld>
 </file>
 
@@ -9968,6 +10973,18 @@
             <a:r>
               <a:rPr lang="en-US" sz="1350" dirty="0">
                 <a:solidFill>
+                  <a:srgbClr val="FF0000"/>
+                </a:solidFill>
+                <a:latin typeface="Courier New"/>
+                <a:ea typeface="Courier New"/>
+                <a:cs typeface="Courier New"/>
+                <a:sym typeface="Courier New"/>
+              </a:rPr>
+              <a:t>Program</a:t>
+            </a:r>
+            <a:r>
+              <a:rPr lang="en-US" sz="1350" dirty="0">
+                <a:solidFill>
                   <a:schemeClr val="dk1"/>
                 </a:solidFill>
                 <a:latin typeface="Courier New"/>
@@ -9975,7 +10992,7 @@
                 <a:cs typeface="Courier New"/>
                 <a:sym typeface="Courier New"/>
               </a:rPr>
-              <a:t>Program(</a:t>
+              <a:t>(</a:t>
             </a:r>
           </a:p>
           <a:p>
@@ -9988,6 +11005,18 @@
             <a:r>
               <a:rPr lang="en-US" sz="1350" dirty="0" err="1">
                 <a:solidFill>
+                  <a:srgbClr val="FF0000"/>
+                </a:solidFill>
+                <a:latin typeface="Courier New"/>
+                <a:ea typeface="Courier New"/>
+                <a:cs typeface="Courier New"/>
+                <a:sym typeface="Courier New"/>
+              </a:rPr>
+              <a:t>ExternFunction</a:t>
+            </a:r>
+            <a:r>
+              <a:rPr lang="en-US" sz="1350" dirty="0">
+                <a:solidFill>
                   <a:schemeClr val="dk1"/>
                 </a:solidFill>
                 <a:latin typeface="Courier New"/>
@@ -9995,10 +11024,22 @@
                 <a:cs typeface="Courier New"/>
                 <a:sym typeface="Courier New"/>
               </a:rPr>
-              <a:t>ExternFunction</a:t>
-            </a:r>
-            <a:r>
-              <a:rPr lang="en-US" sz="1350" dirty="0">
+              <a:t>(</a:t>
+            </a:r>
+            <a:r>
+              <a:rPr lang="en-US" sz="1350" dirty="0" err="1">
+                <a:solidFill>
+                  <a:srgbClr val="0070C0"/>
+                </a:solidFill>
+                <a:latin typeface="Courier New"/>
+                <a:ea typeface="Courier New"/>
+                <a:cs typeface="Courier New"/>
+                <a:sym typeface="Courier New"/>
+              </a:rPr>
+              <a:t>print_int</a:t>
+            </a:r>
+            <a:r>
+              <a:rPr lang="en-US" sz="1350" dirty="0" err="1">
                 <a:solidFill>
                   <a:schemeClr val="dk1"/>
                 </a:solidFill>
@@ -10007,19 +11048,19 @@
                 <a:cs typeface="Courier New"/>
                 <a:sym typeface="Courier New"/>
               </a:rPr>
-              <a:t>(</a:t>
+              <a:t>,VoidType,</a:t>
             </a:r>
             <a:r>
               <a:rPr lang="en-US" sz="1350" dirty="0" err="1">
                 <a:solidFill>
-                  <a:schemeClr val="dk1"/>
-                </a:solidFill>
-                <a:latin typeface="Courier New"/>
-                <a:ea typeface="Courier New"/>
-                <a:cs typeface="Courier New"/>
-                <a:sym typeface="Courier New"/>
-              </a:rPr>
-              <a:t>print_int,VoidType,VarDef</a:t>
+                  <a:srgbClr val="FF0000"/>
+                </a:solidFill>
+                <a:latin typeface="Courier New"/>
+                <a:ea typeface="Courier New"/>
+                <a:cs typeface="Courier New"/>
+                <a:sym typeface="Courier New"/>
+              </a:rPr>
+              <a:t>VarDef</a:t>
             </a:r>
             <a:r>
               <a:rPr lang="en-US" sz="1350" dirty="0">
@@ -10065,6 +11106,18 @@
             <a:r>
               <a:rPr lang="en-US" sz="1350" dirty="0">
                 <a:solidFill>
+                  <a:srgbClr val="FF0000"/>
+                </a:solidFill>
+                <a:latin typeface="Courier New"/>
+                <a:ea typeface="Courier New"/>
+                <a:cs typeface="Courier New"/>
+                <a:sym typeface="Courier New"/>
+              </a:rPr>
+              <a:t>Class</a:t>
+            </a:r>
+            <a:r>
+              <a:rPr lang="en-US" sz="1350" dirty="0">
+                <a:solidFill>
                   <a:schemeClr val="dk1"/>
                 </a:solidFill>
                 <a:latin typeface="Courier New"/>
@@ -10072,7 +11125,31 @@
                 <a:cs typeface="Courier New"/>
                 <a:sym typeface="Courier New"/>
               </a:rPr>
-              <a:t>Class(	C,</a:t>
+              <a:t>(	</a:t>
+            </a:r>
+            <a:r>
+              <a:rPr lang="en-US" sz="1350" dirty="0">
+                <a:solidFill>
+                  <a:srgbClr val="0070C0"/>
+                </a:solidFill>
+                <a:latin typeface="Courier New"/>
+                <a:ea typeface="Courier New"/>
+                <a:cs typeface="Courier New"/>
+                <a:sym typeface="Courier New"/>
+              </a:rPr>
+              <a:t>C</a:t>
+            </a:r>
+            <a:r>
+              <a:rPr lang="en-US" sz="1350" dirty="0">
+                <a:solidFill>
+                  <a:schemeClr val="dk1"/>
+                </a:solidFill>
+                <a:latin typeface="Courier New"/>
+                <a:ea typeface="Courier New"/>
+                <a:cs typeface="Courier New"/>
+                <a:sym typeface="Courier New"/>
+              </a:rPr>
+              <a:t>,</a:t>
             </a:r>
           </a:p>
           <a:p>
@@ -10099,6 +11176,18 @@
             <a:r>
               <a:rPr lang="en-US" sz="1350" dirty="0">
                 <a:solidFill>
+                  <a:srgbClr val="FF0000"/>
+                </a:solidFill>
+                <a:latin typeface="Courier New"/>
+                <a:ea typeface="Courier New"/>
+                <a:cs typeface="Courier New"/>
+                <a:sym typeface="Courier New"/>
+              </a:rPr>
+              <a:t>Method</a:t>
+            </a:r>
+            <a:r>
+              <a:rPr lang="en-US" sz="1350" dirty="0">
+                <a:solidFill>
                   <a:schemeClr val="dk1"/>
                 </a:solidFill>
                 <a:latin typeface="Courier New"/>
@@ -10106,14 +11195,50 @@
                 <a:cs typeface="Courier New"/>
                 <a:sym typeface="Courier New"/>
               </a:rPr>
-              <a:t>Method(foo,</a:t>
-            </a:r>
-          </a:p>
-          <a:p>
-            <a:pPr marL="1371600" indent="290513">
+              <a:t>( </a:t>
+            </a:r>
+            <a:r>
+              <a:rPr lang="en-US" sz="1350" dirty="0">
+                <a:solidFill>
+                  <a:srgbClr val="0070C0"/>
+                </a:solidFill>
+                <a:latin typeface="Courier New"/>
+                <a:ea typeface="Courier New"/>
+                <a:cs typeface="Courier New"/>
+                <a:sym typeface="Courier New"/>
+              </a:rPr>
+              <a:t>foo</a:t>
+            </a:r>
+            <a:r>
+              <a:rPr lang="en-US" sz="1350" dirty="0">
+                <a:solidFill>
+                  <a:schemeClr val="dk1"/>
+                </a:solidFill>
+                <a:latin typeface="Courier New"/>
+                <a:ea typeface="Courier New"/>
+                <a:cs typeface="Courier New"/>
+                <a:sym typeface="Courier New"/>
+              </a:rPr>
+              <a:t>,</a:t>
+            </a:r>
+          </a:p>
+          <a:p>
+            <a:pPr marL="685800" indent="290513">
               <a:buSzPct val="61111"/>
             </a:pPr>
             <a:r>
+              <a:rPr lang="en-US" sz="1350" dirty="0">
+                <a:solidFill>
+                  <a:schemeClr val="dk1"/>
+                </a:solidFill>
+                <a:latin typeface="Courier New"/>
+                <a:ea typeface="Courier New"/>
+                <a:cs typeface="Courier New"/>
+                <a:sym typeface="Courier New"/>
+              </a:rPr>
+              <a:t>	</a:t>
+            </a:r>
+            <a:r>
               <a:rPr lang="en-US" sz="1350" dirty="0" err="1">
                 <a:solidFill>
                   <a:schemeClr val="dk1"/>
@@ -10139,7 +11264,7 @@
             </a:r>
           </a:p>
           <a:p>
-            <a:pPr marL="1371600" indent="290513">
+            <a:pPr marL="685800" indent="290513">
               <a:buSzPct val="61111"/>
             </a:pPr>
             <a:r>
@@ -10152,16 +11277,40 @@
                 <a:cs typeface="Courier New"/>
                 <a:sym typeface="Courier New"/>
               </a:rPr>
-              <a:t>None,</a:t>
-            </a:r>
-          </a:p>
-          <a:p>
-            <a:pPr marL="1371600" indent="290513">
+              <a:t>	None,</a:t>
+            </a:r>
+          </a:p>
+          <a:p>
+            <a:pPr marL="685800" indent="290513">
               <a:buSzPct val="61111"/>
             </a:pPr>
             <a:r>
+              <a:rPr lang="en-US" sz="1350" dirty="0">
+                <a:solidFill>
+                  <a:schemeClr val="dk1"/>
+                </a:solidFill>
+                <a:latin typeface="Courier New"/>
+                <a:ea typeface="Courier New"/>
+                <a:cs typeface="Courier New"/>
+                <a:sym typeface="Courier New"/>
+              </a:rPr>
+              <a:t>	</a:t>
+            </a:r>
+            <a:r>
               <a:rPr lang="en-US" sz="1350" dirty="0" err="1">
                 <a:solidFill>
+                  <a:srgbClr val="FF0000"/>
+                </a:solidFill>
+                <a:latin typeface="Courier New"/>
+                <a:ea typeface="Courier New"/>
+                <a:cs typeface="Courier New"/>
+                <a:sym typeface="Courier New"/>
+              </a:rPr>
+              <a:t>MethodBlock</a:t>
+            </a:r>
+            <a:r>
+              <a:rPr lang="en-US" sz="1350" dirty="0">
+                <a:solidFill>
                   <a:schemeClr val="dk1"/>
                 </a:solidFill>
                 <a:latin typeface="Courier New"/>
@@ -10169,28 +11318,40 @@
                 <a:cs typeface="Courier New"/>
                 <a:sym typeface="Courier New"/>
               </a:rPr>
-              <a:t>MethodBlock</a:t>
-            </a:r>
-            <a:r>
-              <a:rPr lang="en-US" sz="1350" dirty="0">
-                <a:solidFill>
-                  <a:schemeClr val="dk1"/>
-                </a:solidFill>
-                <a:latin typeface="Courier New"/>
-                <a:ea typeface="Courier New"/>
-                <a:cs typeface="Courier New"/>
-                <a:sym typeface="Courier New"/>
-              </a:rPr>
               <a:t>( None,</a:t>
             </a:r>
           </a:p>
           <a:p>
-            <a:pPr marL="2743200" indent="290513">
+            <a:pPr marL="685800" indent="290513">
               <a:buSzPct val="61111"/>
             </a:pPr>
             <a:r>
+              <a:rPr lang="en-US" sz="1350" dirty="0">
+                <a:solidFill>
+                  <a:schemeClr val="dk1"/>
+                </a:solidFill>
+                <a:latin typeface="Courier New"/>
+                <a:ea typeface="Courier New"/>
+                <a:cs typeface="Courier New"/>
+                <a:sym typeface="Courier New"/>
+              </a:rPr>
+              <a:t>		    </a:t>
+            </a:r>
+            <a:r>
               <a:rPr lang="en-US" sz="1350" dirty="0" err="1">
                 <a:solidFill>
+                  <a:srgbClr val="FF0000"/>
+                </a:solidFill>
+                <a:latin typeface="Courier New"/>
+                <a:ea typeface="Courier New"/>
+                <a:cs typeface="Courier New"/>
+                <a:sym typeface="Courier New"/>
+              </a:rPr>
+              <a:t>ReturnStmt</a:t>
+            </a:r>
+            <a:r>
+              <a:rPr lang="en-US" sz="1350" dirty="0">
+                <a:solidFill>
                   <a:schemeClr val="dk1"/>
                 </a:solidFill>
                 <a:latin typeface="Courier New"/>
@@ -10198,7 +11359,19 @@
                 <a:cs typeface="Courier New"/>
                 <a:sym typeface="Courier New"/>
               </a:rPr>
-              <a:t>ReturnStmt</a:t>
+              <a:t>(</a:t>
+            </a:r>
+            <a:r>
+              <a:rPr lang="en-US" sz="1350" dirty="0" err="1">
+                <a:solidFill>
+                  <a:srgbClr val="FF0000"/>
+                </a:solidFill>
+                <a:latin typeface="Courier New"/>
+                <a:ea typeface="Courier New"/>
+                <a:cs typeface="Courier New"/>
+                <a:sym typeface="Courier New"/>
+              </a:rPr>
+              <a:t>BoolExpr</a:t>
             </a:r>
             <a:r>
               <a:rPr lang="en-US" sz="1350" dirty="0">
@@ -10210,10 +11383,27 @@
                 <a:cs typeface="Courier New"/>
                 <a:sym typeface="Courier New"/>
               </a:rPr>
-              <a:t>(</a:t>
-            </a:r>
-            <a:r>
-              <a:rPr lang="en-US" sz="1350" dirty="0" err="1">
+              <a:t>(True)))),</a:t>
+            </a:r>
+          </a:p>
+          <a:p>
+            <a:pPr marL="685800" indent="290513">
+              <a:buSzPct val="61111"/>
+            </a:pPr>
+            <a:r>
+              <a:rPr lang="en-US" sz="1350" dirty="0">
+                <a:solidFill>
+                  <a:srgbClr val="FF0000"/>
+                </a:solidFill>
+                <a:latin typeface="Courier New"/>
+                <a:ea typeface="Courier New"/>
+                <a:cs typeface="Courier New"/>
+                <a:sym typeface="Courier New"/>
+              </a:rPr>
+              <a:t>Method</a:t>
+            </a:r>
+            <a:r>
+              <a:rPr lang="en-US" sz="1350" dirty="0">
                 <a:solidFill>
                   <a:schemeClr val="dk1"/>
                 </a:solidFill>
@@ -10222,11 +11412,23 @@
                 <a:cs typeface="Courier New"/>
                 <a:sym typeface="Courier New"/>
               </a:rPr>
-              <a:t>BoolExpr</a:t>
+              <a:t>( </a:t>
             </a:r>
             <a:r>
               <a:rPr lang="en-US" sz="1350" dirty="0">
                 <a:solidFill>
+                  <a:srgbClr val="0070C0"/>
+                </a:solidFill>
+                <a:latin typeface="Courier New"/>
+                <a:ea typeface="Courier New"/>
+                <a:cs typeface="Courier New"/>
+                <a:sym typeface="Courier New"/>
+              </a:rPr>
+              <a:t>main</a:t>
+            </a:r>
+            <a:r>
+              <a:rPr lang="en-US" sz="1350" dirty="0">
+                <a:solidFill>
                   <a:schemeClr val="dk1"/>
                 </a:solidFill>
                 <a:latin typeface="Courier New"/>
@@ -10234,7 +11436,7 @@
                 <a:cs typeface="Courier New"/>
                 <a:sym typeface="Courier New"/>
               </a:rPr>
-              <a:t>(True)))),</a:t>
+              <a:t>,</a:t>
             </a:r>
           </a:p>
           <a:p>
@@ -10251,13 +11453,8 @@
                 <a:cs typeface="Courier New"/>
                 <a:sym typeface="Courier New"/>
               </a:rPr>
-              <a:t>Method( main,</a:t>
-            </a:r>
-          </a:p>
-          <a:p>
-            <a:pPr marL="1371600" indent="-52388">
-              <a:buSzPct val="61111"/>
-            </a:pPr>
+              <a:t>		</a:t>
+            </a:r>
             <a:r>
               <a:rPr lang="en-US" sz="1350" dirty="0" err="1">
                 <a:solidFill>
@@ -10297,7 +11494,7 @@
                 <a:cs typeface="Courier New"/>
                 <a:sym typeface="Courier New"/>
               </a:rPr>
-              <a:t>None,</a:t>
+              <a:t>	None,</a:t>
             </a:r>
           </a:p>
           <a:p>
@@ -10305,8 +11502,32 @@
               <a:buSzPct val="61111"/>
             </a:pPr>
             <a:r>
+              <a:rPr lang="en-US" sz="1350" dirty="0">
+                <a:solidFill>
+                  <a:schemeClr val="dk1"/>
+                </a:solidFill>
+                <a:latin typeface="Courier New"/>
+                <a:ea typeface="Courier New"/>
+                <a:cs typeface="Courier New"/>
+                <a:sym typeface="Courier New"/>
+              </a:rPr>
+              <a:t>	</a:t>
+            </a:r>
+            <a:r>
               <a:rPr lang="en-US" sz="1350" dirty="0" err="1">
                 <a:solidFill>
+                  <a:srgbClr val="FF0000"/>
+                </a:solidFill>
+                <a:latin typeface="Courier New"/>
+                <a:ea typeface="Courier New"/>
+                <a:cs typeface="Courier New"/>
+                <a:sym typeface="Courier New"/>
+              </a:rPr>
+              <a:t>MethodBlock</a:t>
+            </a:r>
+            <a:r>
+              <a:rPr lang="en-US" sz="1350" dirty="0">
+                <a:solidFill>
                   <a:schemeClr val="dk1"/>
                 </a:solidFill>
                 <a:latin typeface="Courier New"/>
@@ -10314,30 +11535,15 @@
                 <a:cs typeface="Courier New"/>
                 <a:sym typeface="Courier New"/>
               </a:rPr>
-              <a:t>MethodBlock</a:t>
-            </a:r>
-            <a:r>
-              <a:rPr lang="en-US" sz="1350" dirty="0">
-                <a:solidFill>
-                  <a:schemeClr val="dk1"/>
-                </a:solidFill>
-                <a:latin typeface="Courier New"/>
-                <a:ea typeface="Courier New"/>
-                <a:cs typeface="Courier New"/>
-                <a:sym typeface="Courier New"/>
-              </a:rPr>
-              <a:t>(	None,</a:t>
-            </a:r>
-          </a:p>
-          <a:p>
-            <a:pPr marL="2400300" indent="290513">
-              <a:buClr>
-                <a:schemeClr val="dk1"/>
-              </a:buClr>
+              <a:t>( </a:t>
+            </a:r>
+          </a:p>
+          <a:p>
+            <a:pPr marL="1028700" indent="290513">
               <a:buSzPct val="61111"/>
             </a:pPr>
             <a:r>
-              <a:rPr lang="en-US" sz="1350" dirty="0" err="1">
+              <a:rPr lang="en-US" sz="1350" dirty="0">
                 <a:solidFill>
                   <a:schemeClr val="dk1"/>
                 </a:solidFill>
@@ -10346,71 +11552,11 @@
                 <a:cs typeface="Courier New"/>
                 <a:sym typeface="Courier New"/>
               </a:rPr>
-              <a:t>IfStmt</a:t>
-            </a:r>
-            <a:r>
-              <a:rPr lang="en-US" sz="1350" dirty="0">
-                <a:solidFill>
-                  <a:schemeClr val="dk1"/>
-                </a:solidFill>
-                <a:latin typeface="Courier New"/>
-                <a:ea typeface="Courier New"/>
-                <a:cs typeface="Courier New"/>
-                <a:sym typeface="Courier New"/>
-              </a:rPr>
-              <a:t>(</a:t>
-            </a:r>
-            <a:r>
-              <a:rPr lang="en-US" sz="1350" dirty="0" err="1">
-                <a:solidFill>
-                  <a:schemeClr val="dk1"/>
-                </a:solidFill>
-                <a:latin typeface="Courier New"/>
-                <a:ea typeface="Courier New"/>
-                <a:cs typeface="Courier New"/>
-                <a:sym typeface="Courier New"/>
-              </a:rPr>
-              <a:t>MethodCall</a:t>
-            </a:r>
-            <a:r>
-              <a:rPr lang="en-US" sz="1350" dirty="0">
-                <a:solidFill>
-                  <a:schemeClr val="dk1"/>
-                </a:solidFill>
-                <a:latin typeface="Courier New"/>
-                <a:ea typeface="Courier New"/>
-                <a:cs typeface="Courier New"/>
-                <a:sym typeface="Courier New"/>
-              </a:rPr>
-              <a:t>(</a:t>
-            </a:r>
-            <a:r>
-              <a:rPr lang="en-US" sz="1350" dirty="0" err="1">
-                <a:solidFill>
-                  <a:schemeClr val="dk1"/>
-                </a:solidFill>
-                <a:latin typeface="Courier New"/>
-                <a:ea typeface="Courier New"/>
-                <a:cs typeface="Courier New"/>
-                <a:sym typeface="Courier New"/>
-              </a:rPr>
-              <a:t>foo,None</a:t>
-            </a:r>
-            <a:r>
-              <a:rPr lang="en-US" sz="1350" dirty="0">
-                <a:solidFill>
-                  <a:schemeClr val="dk1"/>
-                </a:solidFill>
-                <a:latin typeface="Courier New"/>
-                <a:ea typeface="Courier New"/>
-                <a:cs typeface="Courier New"/>
-                <a:sym typeface="Courier New"/>
-              </a:rPr>
-              <a:t>),</a:t>
-            </a:r>
-          </a:p>
-          <a:p>
-            <a:pPr indent="-52388">
+              <a:t>		None, </a:t>
+            </a:r>
+          </a:p>
+          <a:p>
+            <a:pPr marL="1028700" indent="290513">
               <a:buSzPct val="61111"/>
             </a:pPr>
             <a:r>
@@ -10423,19 +11569,153 @@
                 <a:cs typeface="Courier New"/>
                 <a:sym typeface="Courier New"/>
               </a:rPr>
-              <a:t>                                  Block(None,</a:t>
-            </a:r>
-          </a:p>
-          <a:p>
-            <a:pPr marL="3771900" indent="290513">
-              <a:buClr>
-                <a:schemeClr val="dk1"/>
-              </a:buClr>
+              <a:t>		</a:t>
+            </a:r>
+            <a:r>
+              <a:rPr lang="en-US" sz="1350" dirty="0" err="1">
+                <a:solidFill>
+                  <a:srgbClr val="FF0000"/>
+                </a:solidFill>
+                <a:latin typeface="Courier New"/>
+                <a:ea typeface="Courier New"/>
+                <a:cs typeface="Courier New"/>
+                <a:sym typeface="Courier New"/>
+              </a:rPr>
+              <a:t>IfStmt</a:t>
+            </a:r>
+            <a:r>
+              <a:rPr lang="en-US" sz="1350" dirty="0">
+                <a:solidFill>
+                  <a:schemeClr val="dk1"/>
+                </a:solidFill>
+                <a:latin typeface="Courier New"/>
+                <a:ea typeface="Courier New"/>
+                <a:cs typeface="Courier New"/>
+                <a:sym typeface="Courier New"/>
+              </a:rPr>
+              <a:t>(</a:t>
+            </a:r>
+            <a:r>
+              <a:rPr lang="en-US" sz="1350" dirty="0" err="1">
+                <a:solidFill>
+                  <a:srgbClr val="FF0000"/>
+                </a:solidFill>
+                <a:latin typeface="Courier New"/>
+                <a:ea typeface="Courier New"/>
+                <a:cs typeface="Courier New"/>
+                <a:sym typeface="Courier New"/>
+              </a:rPr>
+              <a:t>MethodCall</a:t>
+            </a:r>
+            <a:r>
+              <a:rPr lang="en-US" sz="1350" dirty="0">
+                <a:solidFill>
+                  <a:schemeClr val="dk1"/>
+                </a:solidFill>
+                <a:latin typeface="Courier New"/>
+                <a:ea typeface="Courier New"/>
+                <a:cs typeface="Courier New"/>
+                <a:sym typeface="Courier New"/>
+              </a:rPr>
+              <a:t>(</a:t>
+            </a:r>
+            <a:r>
+              <a:rPr lang="en-US" sz="1350" dirty="0" err="1">
+                <a:solidFill>
+                  <a:schemeClr val="dk1"/>
+                </a:solidFill>
+                <a:latin typeface="Courier New"/>
+                <a:ea typeface="Courier New"/>
+                <a:cs typeface="Courier New"/>
+                <a:sym typeface="Courier New"/>
+              </a:rPr>
+              <a:t>foo,None</a:t>
+            </a:r>
+            <a:r>
+              <a:rPr lang="en-US" sz="1350" dirty="0">
+                <a:solidFill>
+                  <a:schemeClr val="dk1"/>
+                </a:solidFill>
+                <a:latin typeface="Courier New"/>
+                <a:ea typeface="Courier New"/>
+                <a:cs typeface="Courier New"/>
+                <a:sym typeface="Courier New"/>
+              </a:rPr>
+              <a:t>),                            </a:t>
+            </a:r>
+          </a:p>
+          <a:p>
+            <a:pPr marL="1028700" indent="290513">
               <a:buSzPct val="61111"/>
             </a:pPr>
             <a:r>
+              <a:rPr lang="en-US" sz="1350" dirty="0">
+                <a:solidFill>
+                  <a:schemeClr val="dk1"/>
+                </a:solidFill>
+                <a:latin typeface="Courier New"/>
+                <a:ea typeface="Courier New"/>
+                <a:cs typeface="Courier New"/>
+                <a:sym typeface="Courier New"/>
+              </a:rPr>
+              <a:t>		</a:t>
+            </a:r>
+            <a:r>
+              <a:rPr lang="en-US" sz="1350" dirty="0">
+                <a:solidFill>
+                  <a:srgbClr val="FF0000"/>
+                </a:solidFill>
+                <a:latin typeface="Courier New"/>
+                <a:ea typeface="Courier New"/>
+                <a:cs typeface="Courier New"/>
+                <a:sym typeface="Courier New"/>
+              </a:rPr>
+              <a:t>Block</a:t>
+            </a:r>
+            <a:r>
+              <a:rPr lang="en-US" sz="1350" dirty="0">
+                <a:solidFill>
+                  <a:schemeClr val="dk1"/>
+                </a:solidFill>
+                <a:latin typeface="Courier New"/>
+                <a:ea typeface="Courier New"/>
+                <a:cs typeface="Courier New"/>
+                <a:sym typeface="Courier New"/>
+              </a:rPr>
+              <a:t>(   None,</a:t>
+            </a:r>
+          </a:p>
+          <a:p>
+            <a:pPr marL="1028700" indent="290513">
+              <a:buSzPct val="61111"/>
+            </a:pPr>
+            <a:r>
+              <a:rPr lang="en-US" sz="1350" dirty="0">
+                <a:solidFill>
+                  <a:schemeClr val="dk1"/>
+                </a:solidFill>
+                <a:latin typeface="Courier New"/>
+                <a:ea typeface="Courier New"/>
+                <a:cs typeface="Courier New"/>
+                <a:sym typeface="Courier New"/>
+              </a:rPr>
+              <a:t>			</a:t>
+            </a:r>
+            <a:r>
               <a:rPr lang="en-US" sz="1350" dirty="0" err="1">
                 <a:solidFill>
+                  <a:srgbClr val="FF0000"/>
+                </a:solidFill>
+                <a:latin typeface="Courier New"/>
+                <a:ea typeface="Courier New"/>
+                <a:cs typeface="Courier New"/>
+                <a:sym typeface="Courier New"/>
+              </a:rPr>
+              <a:t>MethodCall</a:t>
+            </a:r>
+            <a:r>
+              <a:rPr lang="en-US" sz="1350" dirty="0">
+                <a:solidFill>
                   <a:schemeClr val="dk1"/>
                 </a:solidFill>
                 <a:latin typeface="Courier New"/>
@@ -10443,7 +11723,43 @@
                 <a:cs typeface="Courier New"/>
                 <a:sym typeface="Courier New"/>
               </a:rPr>
-              <a:t>MethodCall</a:t>
+              <a:t>(</a:t>
+            </a:r>
+            <a:r>
+              <a:rPr lang="en-US" sz="1350" dirty="0" err="1">
+                <a:solidFill>
+                  <a:srgbClr val="0070C0"/>
+                </a:solidFill>
+                <a:latin typeface="Courier New"/>
+                <a:ea typeface="Courier New"/>
+                <a:cs typeface="Courier New"/>
+                <a:sym typeface="Courier New"/>
+              </a:rPr>
+              <a:t>print_int</a:t>
+            </a:r>
+            <a:r>
+              <a:rPr lang="en-US" sz="1350" dirty="0" err="1">
+                <a:solidFill>
+                  <a:schemeClr val="dk1"/>
+                </a:solidFill>
+                <a:latin typeface="Courier New"/>
+                <a:ea typeface="Courier New"/>
+                <a:cs typeface="Courier New"/>
+                <a:sym typeface="Courier New"/>
+              </a:rPr>
+              <a:t>,</a:t>
+            </a:r>
+            <a:r>
+              <a:rPr lang="en-US" sz="1350" dirty="0" err="1">
+                <a:solidFill>
+                  <a:srgbClr val="FF0000"/>
+                </a:solidFill>
+                <a:latin typeface="Courier New"/>
+                <a:ea typeface="Courier New"/>
+                <a:cs typeface="Courier New"/>
+                <a:sym typeface="Courier New"/>
+              </a:rPr>
+              <a:t>Number</a:t>
             </a:r>
             <a:r>
               <a:rPr lang="en-US" sz="1350" dirty="0">
@@ -10458,7 +11774,19 @@
               <a:t>(</a:t>
             </a:r>
             <a:r>
-              <a:rPr lang="en-US" sz="1350" dirty="0" err="1">
+              <a:rPr lang="en-US" sz="1350" dirty="0">
+                <a:solidFill>
+                  <a:srgbClr val="0070C0"/>
+                </a:solidFill>
+                <a:latin typeface="Courier New"/>
+                <a:ea typeface="Courier New"/>
+                <a:cs typeface="Courier New"/>
+                <a:sym typeface="Courier New"/>
+              </a:rPr>
+              <a:t>1</a:t>
+            </a:r>
+            <a:r>
+              <a:rPr lang="en-US" sz="1350" dirty="0">
                 <a:solidFill>
                   <a:schemeClr val="dk1"/>
                 </a:solidFill>
@@ -10467,19 +11795,7 @@
                 <a:cs typeface="Courier New"/>
                 <a:sym typeface="Courier New"/>
               </a:rPr>
-              <a:t>print_int,Number</a:t>
-            </a:r>
-            <a:r>
-              <a:rPr lang="en-US" sz="1350" dirty="0">
-                <a:solidFill>
-                  <a:schemeClr val="dk1"/>
-                </a:solidFill>
-                <a:latin typeface="Courier New"/>
-                <a:ea typeface="Courier New"/>
-                <a:cs typeface="Courier New"/>
-                <a:sym typeface="Courier New"/>
-              </a:rPr>
-              <a:t>(1))),</a:t>
+              <a:t>))),</a:t>
             </a:r>
           </a:p>
           <a:p>
@@ -10499,7 +11815,7 @@
                 <a:cs typeface="Courier New"/>
                 <a:sym typeface="Courier New"/>
               </a:rPr>
-              <a:t>                           None)))))</a:t>
+              <a:t>                           	None)))))</a:t>
             </a:r>
           </a:p>
           <a:p>
@@ -11809,18 +13125,6 @@
             </a:r>
           </a:p>
           <a:p>
-            <a:r>
-              <a:rPr lang="en-US" sz="1350" dirty="0">
-                <a:solidFill>
-                  <a:schemeClr val="dk1"/>
-                </a:solidFill>
-                <a:latin typeface="Courier New"/>
-                <a:ea typeface="Courier New"/>
-                <a:cs typeface="Courier New"/>
-                <a:sym typeface="Courier New"/>
-              </a:rPr>
-              <a:t>  </a:t>
-            </a:r>
             <a:r>
               <a:rPr lang="en-US" sz="1350" dirty="0" err="1">
                 <a:solidFill>
@@ -12765,7 +14069,7 @@
         <p:spPr>
           <a:xfrm>
             <a:off x="2258663" y="1162781"/>
-            <a:ext cx="4626675" cy="3604950"/>
+            <a:ext cx="4626675" cy="3191170"/>
           </a:xfrm>
           <a:prstGeom prst="rect">
             <a:avLst/>
@@ -13133,28 +14437,6 @@
               </a:rPr>
               <a:t>}</a:t>
             </a:r>
-          </a:p>
-          <a:p>
-            <a:pPr indent="-52388">
-              <a:buClr>
-                <a:schemeClr val="dk1"/>
-              </a:buClr>
-            </a:pPr>
-            <a:endParaRPr sz="1350" dirty="0">
-              <a:latin typeface="Courier New"/>
-              <a:ea typeface="Courier New"/>
-              <a:cs typeface="Courier New"/>
-              <a:sym typeface="Courier New"/>
-            </a:endParaRPr>
-          </a:p>
-          <a:p>
-            <a:pPr indent="-52388"/>
-            <a:endParaRPr sz="1350" dirty="0">
-              <a:latin typeface="Courier New"/>
-              <a:ea typeface="Courier New"/>
-              <a:cs typeface="Courier New"/>
-              <a:sym typeface="Courier New"/>
-            </a:endParaRPr>
           </a:p>
         </p:txBody>
       </p:sp>

</xml_diff>